<commit_message>
Done 95% báo cáo QLTB
Chỉ liệt kê danh mục cho bảng và sơ đồ. Hình minh họa KHÔNG liệt kê.
TODO:
-Dẫn nguồn cho 2 hình minh họa từ ngoài
-Review lại chính tả
-Rút gọn bớt các phần không cần thiết
</commit_message>
<xml_diff>
--- a/_BaoCao/quocdunginfo/PTB - Usecases.pptx
+++ b/_BaoCao/quocdunginfo/PTB - Usecases.pptx
@@ -104,6 +104,11 @@
       </a:defRPr>
     </a:lvl9pPr>
   </p:defaultTextStyle>
+  <p:extLst>
+    <p:ext uri="{EFAFB233-063F-42B5-8137-9DF3F51BA10A}">
+      <p15:sldGuideLst xmlns:p15="http://schemas.microsoft.com/office/powerpoint/2012/main"/>
+    </p:ext>
+  </p:extLst>
 </p:presentation>
 </file>
 
@@ -238,7 +243,7 @@
           <a:p>
             <a:fld id="{F8FF756E-1B4C-4515-BC5D-6E1D70FF4976}" type="datetimeFigureOut">
               <a:rPr lang="en-US" smtClean="0"/>
-              <a:t>26/10/2014</a:t>
+              <a:t>28/10/2014</a:t>
             </a:fld>
             <a:endParaRPr lang="en-US"/>
           </a:p>
@@ -408,7 +413,7 @@
           <a:p>
             <a:fld id="{F8FF756E-1B4C-4515-BC5D-6E1D70FF4976}" type="datetimeFigureOut">
               <a:rPr lang="en-US" smtClean="0"/>
-              <a:t>26/10/2014</a:t>
+              <a:t>28/10/2014</a:t>
             </a:fld>
             <a:endParaRPr lang="en-US"/>
           </a:p>
@@ -588,7 +593,7 @@
           <a:p>
             <a:fld id="{F8FF756E-1B4C-4515-BC5D-6E1D70FF4976}" type="datetimeFigureOut">
               <a:rPr lang="en-US" smtClean="0"/>
-              <a:t>26/10/2014</a:t>
+              <a:t>28/10/2014</a:t>
             </a:fld>
             <a:endParaRPr lang="en-US"/>
           </a:p>
@@ -758,7 +763,7 @@
           <a:p>
             <a:fld id="{F8FF756E-1B4C-4515-BC5D-6E1D70FF4976}" type="datetimeFigureOut">
               <a:rPr lang="en-US" smtClean="0"/>
-              <a:t>26/10/2014</a:t>
+              <a:t>28/10/2014</a:t>
             </a:fld>
             <a:endParaRPr lang="en-US"/>
           </a:p>
@@ -1004,7 +1009,7 @@
           <a:p>
             <a:fld id="{F8FF756E-1B4C-4515-BC5D-6E1D70FF4976}" type="datetimeFigureOut">
               <a:rPr lang="en-US" smtClean="0"/>
-              <a:t>26/10/2014</a:t>
+              <a:t>28/10/2014</a:t>
             </a:fld>
             <a:endParaRPr lang="en-US"/>
           </a:p>
@@ -1236,7 +1241,7 @@
           <a:p>
             <a:fld id="{F8FF756E-1B4C-4515-BC5D-6E1D70FF4976}" type="datetimeFigureOut">
               <a:rPr lang="en-US" smtClean="0"/>
-              <a:t>26/10/2014</a:t>
+              <a:t>28/10/2014</a:t>
             </a:fld>
             <a:endParaRPr lang="en-US"/>
           </a:p>
@@ -1603,7 +1608,7 @@
           <a:p>
             <a:fld id="{F8FF756E-1B4C-4515-BC5D-6E1D70FF4976}" type="datetimeFigureOut">
               <a:rPr lang="en-US" smtClean="0"/>
-              <a:t>26/10/2014</a:t>
+              <a:t>28/10/2014</a:t>
             </a:fld>
             <a:endParaRPr lang="en-US"/>
           </a:p>
@@ -1721,7 +1726,7 @@
           <a:p>
             <a:fld id="{F8FF756E-1B4C-4515-BC5D-6E1D70FF4976}" type="datetimeFigureOut">
               <a:rPr lang="en-US" smtClean="0"/>
-              <a:t>26/10/2014</a:t>
+              <a:t>28/10/2014</a:t>
             </a:fld>
             <a:endParaRPr lang="en-US"/>
           </a:p>
@@ -1816,7 +1821,7 @@
           <a:p>
             <a:fld id="{F8FF756E-1B4C-4515-BC5D-6E1D70FF4976}" type="datetimeFigureOut">
               <a:rPr lang="en-US" smtClean="0"/>
-              <a:t>26/10/2014</a:t>
+              <a:t>28/10/2014</a:t>
             </a:fld>
             <a:endParaRPr lang="en-US"/>
           </a:p>
@@ -2093,7 +2098,7 @@
           <a:p>
             <a:fld id="{F8FF756E-1B4C-4515-BC5D-6E1D70FF4976}" type="datetimeFigureOut">
               <a:rPr lang="en-US" smtClean="0"/>
-              <a:t>26/10/2014</a:t>
+              <a:t>28/10/2014</a:t>
             </a:fld>
             <a:endParaRPr lang="en-US"/>
           </a:p>
@@ -2346,7 +2351,7 @@
           <a:p>
             <a:fld id="{F8FF756E-1B4C-4515-BC5D-6E1D70FF4976}" type="datetimeFigureOut">
               <a:rPr lang="en-US" smtClean="0"/>
-              <a:t>26/10/2014</a:t>
+              <a:t>28/10/2014</a:t>
             </a:fld>
             <a:endParaRPr lang="en-US"/>
           </a:p>
@@ -2559,7 +2564,7 @@
           <a:p>
             <a:fld id="{F8FF756E-1B4C-4515-BC5D-6E1D70FF4976}" type="datetimeFigureOut">
               <a:rPr lang="en-US" smtClean="0"/>
-              <a:t>26/10/2014</a:t>
+              <a:t>28/10/2014</a:t>
             </a:fld>
             <a:endParaRPr lang="en-US"/>
           </a:p>
@@ -3029,7 +3034,18 @@
                 <a:ea typeface="Tahoma" panose="020B0604030504040204" pitchFamily="34" charset="0"/>
                 <a:cs typeface="Tahoma" panose="020B0604030504040204" pitchFamily="34" charset="0"/>
               </a:rPr>
-              <a:t>loại thiết bị, tình trạng</a:t>
+              <a:t>loại thiết bị, tình </a:t>
+            </a:r>
+            <a:r>
+              <a:rPr lang="en-US" sz="1600" smtClean="0">
+                <a:solidFill>
+                  <a:schemeClr val="tx1"/>
+                </a:solidFill>
+                <a:latin typeface="Tahoma" panose="020B0604030504040204" pitchFamily="34" charset="0"/>
+                <a:ea typeface="Tahoma" panose="020B0604030504040204" pitchFamily="34" charset="0"/>
+                <a:cs typeface="Tahoma" panose="020B0604030504040204" pitchFamily="34" charset="0"/>
+              </a:rPr>
+              <a:t>trạng,..</a:t>
             </a:r>
             <a:endParaRPr lang="en-US" sz="1600">
               <a:solidFill>
@@ -3541,7 +3557,18 @@
                 <a:ea typeface="Tahoma" panose="020B0604030504040204" pitchFamily="34" charset="0"/>
                 <a:cs typeface="Tahoma" panose="020B0604030504040204" pitchFamily="34" charset="0"/>
               </a:rPr>
-              <a:t>Quản lý cơ sở, dãy, tầng, phòng, </a:t>
+              <a:t>Quản lý cơ sở, dãy, tầng, </a:t>
+            </a:r>
+            <a:r>
+              <a:rPr lang="en-US" sz="1600" smtClean="0">
+                <a:solidFill>
+                  <a:schemeClr val="tx1"/>
+                </a:solidFill>
+                <a:latin typeface="Tahoma" panose="020B0604030504040204" pitchFamily="34" charset="0"/>
+                <a:ea typeface="Tahoma" panose="020B0604030504040204" pitchFamily="34" charset="0"/>
+                <a:cs typeface="Tahoma" panose="020B0604030504040204" pitchFamily="34" charset="0"/>
+              </a:rPr>
+              <a:t>phòng </a:t>
             </a:r>
             <a:endParaRPr lang="en-US" sz="1600">
               <a:solidFill>

</xml_diff>